<commit_message>
Add description for HEAD.
</commit_message>
<xml_diff>
--- a/static/images/git-repository/git_repo.pptx
+++ b/static/images/git-repository/git_repo.pptx
@@ -294,7 +294,7 @@
           <a:p>
             <a:fld id="{8CB4B4FF-AE23-4E1E-B51C-5ED850CF274A}" type="datetimeFigureOut">
               <a:rPr kumimoji="1" lang="ja-JP" altLang="en-US" smtClean="0"/>
-              <a:t>2016/4/17</a:t>
+              <a:t>2016/4/30</a:t>
             </a:fld>
             <a:endParaRPr kumimoji="1" lang="ja-JP" altLang="en-US"/>
           </a:p>
@@ -496,7 +496,7 @@
           <a:p>
             <a:fld id="{8CB4B4FF-AE23-4E1E-B51C-5ED850CF274A}" type="datetimeFigureOut">
               <a:rPr kumimoji="1" lang="ja-JP" altLang="en-US" smtClean="0"/>
-              <a:t>2016/4/17</a:t>
+              <a:t>2016/4/30</a:t>
             </a:fld>
             <a:endParaRPr kumimoji="1" lang="ja-JP" altLang="en-US"/>
           </a:p>
@@ -708,7 +708,7 @@
           <a:p>
             <a:fld id="{8CB4B4FF-AE23-4E1E-B51C-5ED850CF274A}" type="datetimeFigureOut">
               <a:rPr kumimoji="1" lang="ja-JP" altLang="en-US" smtClean="0"/>
-              <a:t>2016/4/17</a:t>
+              <a:t>2016/4/30</a:t>
             </a:fld>
             <a:endParaRPr kumimoji="1" lang="ja-JP" altLang="en-US"/>
           </a:p>
@@ -910,7 +910,7 @@
           <a:p>
             <a:fld id="{8CB4B4FF-AE23-4E1E-B51C-5ED850CF274A}" type="datetimeFigureOut">
               <a:rPr kumimoji="1" lang="ja-JP" altLang="en-US" smtClean="0"/>
-              <a:t>2016/4/17</a:t>
+              <a:t>2016/4/30</a:t>
             </a:fld>
             <a:endParaRPr kumimoji="1" lang="ja-JP" altLang="en-US"/>
           </a:p>
@@ -1156,7 +1156,7 @@
           <a:p>
             <a:fld id="{8CB4B4FF-AE23-4E1E-B51C-5ED850CF274A}" type="datetimeFigureOut">
               <a:rPr kumimoji="1" lang="ja-JP" altLang="en-US" smtClean="0"/>
-              <a:t>2016/4/17</a:t>
+              <a:t>2016/4/30</a:t>
             </a:fld>
             <a:endParaRPr kumimoji="1" lang="ja-JP" altLang="en-US"/>
           </a:p>
@@ -1508,7 +1508,7 @@
           <a:p>
             <a:fld id="{8CB4B4FF-AE23-4E1E-B51C-5ED850CF274A}" type="datetimeFigureOut">
               <a:rPr kumimoji="1" lang="ja-JP" altLang="en-US" smtClean="0"/>
-              <a:t>2016/4/17</a:t>
+              <a:t>2016/4/30</a:t>
             </a:fld>
             <a:endParaRPr kumimoji="1" lang="ja-JP" altLang="en-US"/>
           </a:p>
@@ -1994,7 +1994,7 @@
           <a:p>
             <a:fld id="{8CB4B4FF-AE23-4E1E-B51C-5ED850CF274A}" type="datetimeFigureOut">
               <a:rPr kumimoji="1" lang="ja-JP" altLang="en-US" smtClean="0"/>
-              <a:t>2016/4/17</a:t>
+              <a:t>2016/4/30</a:t>
             </a:fld>
             <a:endParaRPr kumimoji="1" lang="ja-JP" altLang="en-US"/>
           </a:p>
@@ -2112,7 +2112,7 @@
           <a:p>
             <a:fld id="{8CB4B4FF-AE23-4E1E-B51C-5ED850CF274A}" type="datetimeFigureOut">
               <a:rPr kumimoji="1" lang="ja-JP" altLang="en-US" smtClean="0"/>
-              <a:t>2016/4/17</a:t>
+              <a:t>2016/4/30</a:t>
             </a:fld>
             <a:endParaRPr kumimoji="1" lang="ja-JP" altLang="en-US"/>
           </a:p>
@@ -2207,7 +2207,7 @@
           <a:p>
             <a:fld id="{8CB4B4FF-AE23-4E1E-B51C-5ED850CF274A}" type="datetimeFigureOut">
               <a:rPr kumimoji="1" lang="ja-JP" altLang="en-US" smtClean="0"/>
-              <a:t>2016/4/17</a:t>
+              <a:t>2016/4/30</a:t>
             </a:fld>
             <a:endParaRPr kumimoji="1" lang="ja-JP" altLang="en-US"/>
           </a:p>
@@ -2516,7 +2516,7 @@
           <a:p>
             <a:fld id="{8CB4B4FF-AE23-4E1E-B51C-5ED850CF274A}" type="datetimeFigureOut">
               <a:rPr kumimoji="1" lang="ja-JP" altLang="en-US" smtClean="0"/>
-              <a:t>2016/4/17</a:t>
+              <a:t>2016/4/30</a:t>
             </a:fld>
             <a:endParaRPr kumimoji="1" lang="ja-JP" altLang="en-US"/>
           </a:p>
@@ -2769,7 +2769,7 @@
           <a:p>
             <a:fld id="{8CB4B4FF-AE23-4E1E-B51C-5ED850CF274A}" type="datetimeFigureOut">
               <a:rPr kumimoji="1" lang="ja-JP" altLang="en-US" smtClean="0"/>
-              <a:t>2016/4/17</a:t>
+              <a:t>2016/4/30</a:t>
             </a:fld>
             <a:endParaRPr kumimoji="1" lang="ja-JP" altLang="en-US"/>
           </a:p>
@@ -3014,7 +3014,7 @@
           <a:p>
             <a:fld id="{8CB4B4FF-AE23-4E1E-B51C-5ED850CF274A}" type="datetimeFigureOut">
               <a:rPr kumimoji="1" lang="ja-JP" altLang="en-US" smtClean="0"/>
-              <a:t>2016/4/17</a:t>
+              <a:t>2016/4/30</a:t>
             </a:fld>
             <a:endParaRPr kumimoji="1" lang="ja-JP" altLang="en-US"/>
           </a:p>
@@ -3702,10 +3702,16 @@
           <a:lstStyle/>
           <a:p>
             <a:r>
+              <a:rPr lang="ja-JP" altLang="en-US" b="1" smtClean="0">
+                <a:ea typeface="ＭＳ ゴシック" panose="020B0609070205080204" pitchFamily="49" charset="-128"/>
+              </a:rPr>
+              <a:t>初期</a:t>
+            </a:r>
+            <a:r>
               <a:rPr lang="ja-JP" altLang="en-US" b="1" dirty="0" smtClean="0">
                 <a:ea typeface="ＭＳ ゴシック" panose="020B0609070205080204" pitchFamily="49" charset="-128"/>
               </a:rPr>
-              <a:t>プロジェクトの初期状態。</a:t>
+              <a:t>状態。</a:t>
             </a:r>
             <a:endParaRPr lang="en-US" altLang="ja-JP" b="1" dirty="0" smtClean="0">
               <a:ea typeface="ＭＳ ゴシック" panose="020B0609070205080204" pitchFamily="49" charset="-128"/>

</xml_diff>